<commit_message>
Change made to the presentation
Number format modification
</commit_message>
<xml_diff>
--- a/INFM600_0201_Release_Folder/INFM600_0201_Grand_Presentation/INFM600_0201_Grand_ProjectPresentation.pptx
+++ b/INFM600_0201_Release_Folder/INFM600_0201_Grand_Presentation/INFM600_0201_Grand_ProjectPresentation.pptx
@@ -1116,7 +1116,7 @@
 </dgm:colorsDef>
 </file>
 
-<file path=ppt/diagrams/colors3.xml><?xml version="1.0" encoding="utf-8"?>
+<file path=ppt/diagrams/colors2.xml><?xml version="1.0" encoding="utf-8"?>
 <dgm:colorsDef xmlns:dgm="http://schemas.openxmlformats.org/drawingml/2006/diagram" xmlns:a="http://schemas.openxmlformats.org/drawingml/2006/main" uniqueId="urn:microsoft.com/office/officeart/2005/8/colors/accent2_1">
   <dgm:title val=""/>
   <dgm:desc val=""/>
@@ -1923,7 +1923,7 @@
 </dgm:colorsDef>
 </file>
 
-<file path=ppt/diagrams/colors4.xml><?xml version="1.0" encoding="utf-8"?>
+<file path=ppt/diagrams/colors3.xml><?xml version="1.0" encoding="utf-8"?>
 <dgm:colorsDef xmlns:dgm="http://schemas.openxmlformats.org/drawingml/2006/diagram" xmlns:a="http://schemas.openxmlformats.org/drawingml/2006/main" uniqueId="urn:microsoft.com/office/officeart/2005/8/colors/accent1_2">
   <dgm:title val=""/>
   <dgm:desc val=""/>
@@ -2670,7 +2670,7 @@
 </dgm:colorsDef>
 </file>
 
-<file path=ppt/diagrams/colors5.xml><?xml version="1.0" encoding="utf-8"?>
+<file path=ppt/diagrams/colors4.xml><?xml version="1.0" encoding="utf-8"?>
 <dgm:colorsDef xmlns:dgm="http://schemas.openxmlformats.org/drawingml/2006/diagram" xmlns:a="http://schemas.openxmlformats.org/drawingml/2006/main" uniqueId="urn:microsoft.com/office/officeart/2005/8/colors/accent1_2">
   <dgm:title val=""/>
   <dgm:desc val=""/>
@@ -7677,7 +7677,7 @@
 </dgm:layoutDef>
 </file>
 
-<file path=ppt/diagrams/layout3.xml><?xml version="1.0" encoding="utf-8"?>
+<file path=ppt/diagrams/layout2.xml><?xml version="1.0" encoding="utf-8"?>
 <dgm:layoutDef xmlns:dgm="http://schemas.openxmlformats.org/drawingml/2006/diagram" xmlns:a="http://schemas.openxmlformats.org/drawingml/2006/main" uniqueId="urn:microsoft.com/office/officeart/2005/8/layout/vList3">
   <dgm:title val=""/>
   <dgm:desc val=""/>
@@ -7840,7 +7840,7 @@
 </dgm:layoutDef>
 </file>
 
-<file path=ppt/diagrams/layout4.xml><?xml version="1.0" encoding="utf-8"?>
+<file path=ppt/diagrams/layout3.xml><?xml version="1.0" encoding="utf-8"?>
 <dgm:layoutDef xmlns:dgm="http://schemas.openxmlformats.org/drawingml/2006/diagram" xmlns:a="http://schemas.openxmlformats.org/drawingml/2006/main" uniqueId="urn:microsoft.com/office/officeart/2005/8/layout/bList2">
   <dgm:title val=""/>
   <dgm:desc val=""/>
@@ -8090,7 +8090,7 @@
 </dgm:layoutDef>
 </file>
 
-<file path=ppt/diagrams/layout5.xml><?xml version="1.0" encoding="utf-8"?>
+<file path=ppt/diagrams/layout4.xml><?xml version="1.0" encoding="utf-8"?>
 <dgm:layoutDef xmlns:dgm="http://schemas.openxmlformats.org/drawingml/2006/diagram" xmlns:a="http://schemas.openxmlformats.org/drawingml/2006/main" uniqueId="urn:microsoft.com/office/officeart/2005/8/layout/vList6">
   <dgm:title val=""/>
   <dgm:desc val=""/>
@@ -9330,6 +9330,1040 @@
 </dgm:styleDef>
 </file>
 
+<file path=ppt/diagrams/quickStyle2.xml><?xml version="1.0" encoding="utf-8"?>
+<dgm:styleDef xmlns:dgm="http://schemas.openxmlformats.org/drawingml/2006/diagram" xmlns:a="http://schemas.openxmlformats.org/drawingml/2006/main" uniqueId="urn:microsoft.com/office/officeart/2005/8/quickstyle/simple1">
+  <dgm:title val=""/>
+  <dgm:desc val=""/>
+  <dgm:catLst>
+    <dgm:cat type="simple" pri="10100"/>
+  </dgm:catLst>
+  <dgm:scene3d>
+    <a:camera prst="orthographicFront"/>
+    <a:lightRig rig="threePt" dir="t"/>
+  </dgm:scene3d>
+  <dgm:styleLbl name="node0">
+    <dgm:scene3d>
+      <a:camera prst="orthographicFront"/>
+      <a:lightRig rig="threePt" dir="t"/>
+    </dgm:scene3d>
+    <dgm:sp3d/>
+    <dgm:txPr/>
+    <dgm:style>
+      <a:lnRef idx="2">
+        <a:scrgbClr r="0" g="0" b="0"/>
+      </a:lnRef>
+      <a:fillRef idx="1">
+        <a:scrgbClr r="0" g="0" b="0"/>
+      </a:fillRef>
+      <a:effectRef idx="0">
+        <a:scrgbClr r="0" g="0" b="0"/>
+      </a:effectRef>
+      <a:fontRef idx="minor">
+        <a:schemeClr val="lt1"/>
+      </a:fontRef>
+    </dgm:style>
+  </dgm:styleLbl>
+  <dgm:styleLbl name="lnNode1">
+    <dgm:scene3d>
+      <a:camera prst="orthographicFront"/>
+      <a:lightRig rig="threePt" dir="t"/>
+    </dgm:scene3d>
+    <dgm:sp3d/>
+    <dgm:txPr/>
+    <dgm:style>
+      <a:lnRef idx="2">
+        <a:scrgbClr r="0" g="0" b="0"/>
+      </a:lnRef>
+      <a:fillRef idx="1">
+        <a:scrgbClr r="0" g="0" b="0"/>
+      </a:fillRef>
+      <a:effectRef idx="0">
+        <a:scrgbClr r="0" g="0" b="0"/>
+      </a:effectRef>
+      <a:fontRef idx="minor">
+        <a:schemeClr val="lt1"/>
+      </a:fontRef>
+    </dgm:style>
+  </dgm:styleLbl>
+  <dgm:styleLbl name="vennNode1">
+    <dgm:scene3d>
+      <a:camera prst="orthographicFront"/>
+      <a:lightRig rig="threePt" dir="t"/>
+    </dgm:scene3d>
+    <dgm:sp3d/>
+    <dgm:txPr/>
+    <dgm:style>
+      <a:lnRef idx="2">
+        <a:scrgbClr r="0" g="0" b="0"/>
+      </a:lnRef>
+      <a:fillRef idx="1">
+        <a:scrgbClr r="0" g="0" b="0"/>
+      </a:fillRef>
+      <a:effectRef idx="0">
+        <a:scrgbClr r="0" g="0" b="0"/>
+      </a:effectRef>
+      <a:fontRef idx="minor">
+        <a:schemeClr val="tx1"/>
+      </a:fontRef>
+    </dgm:style>
+  </dgm:styleLbl>
+  <dgm:styleLbl name="alignNode1">
+    <dgm:scene3d>
+      <a:camera prst="orthographicFront"/>
+      <a:lightRig rig="threePt" dir="t"/>
+    </dgm:scene3d>
+    <dgm:sp3d/>
+    <dgm:txPr/>
+    <dgm:style>
+      <a:lnRef idx="2">
+        <a:scrgbClr r="0" g="0" b="0"/>
+      </a:lnRef>
+      <a:fillRef idx="1">
+        <a:scrgbClr r="0" g="0" b="0"/>
+      </a:fillRef>
+      <a:effectRef idx="0">
+        <a:scrgbClr r="0" g="0" b="0"/>
+      </a:effectRef>
+      <a:fontRef idx="minor">
+        <a:schemeClr val="lt1"/>
+      </a:fontRef>
+    </dgm:style>
+  </dgm:styleLbl>
+  <dgm:styleLbl name="node1">
+    <dgm:scene3d>
+      <a:camera prst="orthographicFront"/>
+      <a:lightRig rig="threePt" dir="t"/>
+    </dgm:scene3d>
+    <dgm:sp3d/>
+    <dgm:txPr/>
+    <dgm:style>
+      <a:lnRef idx="2">
+        <a:scrgbClr r="0" g="0" b="0"/>
+      </a:lnRef>
+      <a:fillRef idx="1">
+        <a:scrgbClr r="0" g="0" b="0"/>
+      </a:fillRef>
+      <a:effectRef idx="0">
+        <a:scrgbClr r="0" g="0" b="0"/>
+      </a:effectRef>
+      <a:fontRef idx="minor">
+        <a:schemeClr val="lt1"/>
+      </a:fontRef>
+    </dgm:style>
+  </dgm:styleLbl>
+  <dgm:styleLbl name="node2">
+    <dgm:scene3d>
+      <a:camera prst="orthographicFront"/>
+      <a:lightRig rig="threePt" dir="t"/>
+    </dgm:scene3d>
+    <dgm:sp3d/>
+    <dgm:txPr/>
+    <dgm:style>
+      <a:lnRef idx="2">
+        <a:scrgbClr r="0" g="0" b="0"/>
+      </a:lnRef>
+      <a:fillRef idx="1">
+        <a:scrgbClr r="0" g="0" b="0"/>
+      </a:fillRef>
+      <a:effectRef idx="0">
+        <a:scrgbClr r="0" g="0" b="0"/>
+      </a:effectRef>
+      <a:fontRef idx="minor">
+        <a:schemeClr val="lt1"/>
+      </a:fontRef>
+    </dgm:style>
+  </dgm:styleLbl>
+  <dgm:styleLbl name="node3">
+    <dgm:scene3d>
+      <a:camera prst="orthographicFront"/>
+      <a:lightRig rig="threePt" dir="t"/>
+    </dgm:scene3d>
+    <dgm:sp3d/>
+    <dgm:txPr/>
+    <dgm:style>
+      <a:lnRef idx="2">
+        <a:scrgbClr r="0" g="0" b="0"/>
+      </a:lnRef>
+      <a:fillRef idx="1">
+        <a:scrgbClr r="0" g="0" b="0"/>
+      </a:fillRef>
+      <a:effectRef idx="0">
+        <a:scrgbClr r="0" g="0" b="0"/>
+      </a:effectRef>
+      <a:fontRef idx="minor">
+        <a:schemeClr val="lt1"/>
+      </a:fontRef>
+    </dgm:style>
+  </dgm:styleLbl>
+  <dgm:styleLbl name="node4">
+    <dgm:scene3d>
+      <a:camera prst="orthographicFront"/>
+      <a:lightRig rig="threePt" dir="t"/>
+    </dgm:scene3d>
+    <dgm:sp3d/>
+    <dgm:txPr/>
+    <dgm:style>
+      <a:lnRef idx="2">
+        <a:scrgbClr r="0" g="0" b="0"/>
+      </a:lnRef>
+      <a:fillRef idx="1">
+        <a:scrgbClr r="0" g="0" b="0"/>
+      </a:fillRef>
+      <a:effectRef idx="0">
+        <a:scrgbClr r="0" g="0" b="0"/>
+      </a:effectRef>
+      <a:fontRef idx="minor">
+        <a:schemeClr val="lt1"/>
+      </a:fontRef>
+    </dgm:style>
+  </dgm:styleLbl>
+  <dgm:styleLbl name="fgImgPlace1">
+    <dgm:scene3d>
+      <a:camera prst="orthographicFront"/>
+      <a:lightRig rig="threePt" dir="t"/>
+    </dgm:scene3d>
+    <dgm:sp3d/>
+    <dgm:txPr/>
+    <dgm:style>
+      <a:lnRef idx="2">
+        <a:scrgbClr r="0" g="0" b="0"/>
+      </a:lnRef>
+      <a:fillRef idx="1">
+        <a:scrgbClr r="0" g="0" b="0"/>
+      </a:fillRef>
+      <a:effectRef idx="0">
+        <a:scrgbClr r="0" g="0" b="0"/>
+      </a:effectRef>
+      <a:fontRef idx="minor"/>
+    </dgm:style>
+  </dgm:styleLbl>
+  <dgm:styleLbl name="alignImgPlace1">
+    <dgm:scene3d>
+      <a:camera prst="orthographicFront"/>
+      <a:lightRig rig="threePt" dir="t"/>
+    </dgm:scene3d>
+    <dgm:sp3d/>
+    <dgm:txPr/>
+    <dgm:style>
+      <a:lnRef idx="2">
+        <a:scrgbClr r="0" g="0" b="0"/>
+      </a:lnRef>
+      <a:fillRef idx="1">
+        <a:scrgbClr r="0" g="0" b="0"/>
+      </a:fillRef>
+      <a:effectRef idx="0">
+        <a:scrgbClr r="0" g="0" b="0"/>
+      </a:effectRef>
+      <a:fontRef idx="minor"/>
+    </dgm:style>
+  </dgm:styleLbl>
+  <dgm:styleLbl name="bgImgPlace1">
+    <dgm:scene3d>
+      <a:camera prst="orthographicFront"/>
+      <a:lightRig rig="threePt" dir="t"/>
+    </dgm:scene3d>
+    <dgm:sp3d/>
+    <dgm:txPr/>
+    <dgm:style>
+      <a:lnRef idx="2">
+        <a:scrgbClr r="0" g="0" b="0"/>
+      </a:lnRef>
+      <a:fillRef idx="1">
+        <a:scrgbClr r="0" g="0" b="0"/>
+      </a:fillRef>
+      <a:effectRef idx="0">
+        <a:scrgbClr r="0" g="0" b="0"/>
+      </a:effectRef>
+      <a:fontRef idx="minor"/>
+    </dgm:style>
+  </dgm:styleLbl>
+  <dgm:styleLbl name="sibTrans2D1">
+    <dgm:scene3d>
+      <a:camera prst="orthographicFront"/>
+      <a:lightRig rig="threePt" dir="t"/>
+    </dgm:scene3d>
+    <dgm:sp3d/>
+    <dgm:txPr/>
+    <dgm:style>
+      <a:lnRef idx="0">
+        <a:scrgbClr r="0" g="0" b="0"/>
+      </a:lnRef>
+      <a:fillRef idx="1">
+        <a:scrgbClr r="0" g="0" b="0"/>
+      </a:fillRef>
+      <a:effectRef idx="0">
+        <a:scrgbClr r="0" g="0" b="0"/>
+      </a:effectRef>
+      <a:fontRef idx="minor">
+        <a:schemeClr val="lt1"/>
+      </a:fontRef>
+    </dgm:style>
+  </dgm:styleLbl>
+  <dgm:styleLbl name="fgSibTrans2D1">
+    <dgm:scene3d>
+      <a:camera prst="orthographicFront"/>
+      <a:lightRig rig="threePt" dir="t"/>
+    </dgm:scene3d>
+    <dgm:sp3d/>
+    <dgm:txPr/>
+    <dgm:style>
+      <a:lnRef idx="0">
+        <a:scrgbClr r="0" g="0" b="0"/>
+      </a:lnRef>
+      <a:fillRef idx="1">
+        <a:scrgbClr r="0" g="0" b="0"/>
+      </a:fillRef>
+      <a:effectRef idx="0">
+        <a:scrgbClr r="0" g="0" b="0"/>
+      </a:effectRef>
+      <a:fontRef idx="minor">
+        <a:schemeClr val="lt1"/>
+      </a:fontRef>
+    </dgm:style>
+  </dgm:styleLbl>
+  <dgm:styleLbl name="bgSibTrans2D1">
+    <dgm:scene3d>
+      <a:camera prst="orthographicFront"/>
+      <a:lightRig rig="threePt" dir="t"/>
+    </dgm:scene3d>
+    <dgm:sp3d/>
+    <dgm:txPr/>
+    <dgm:style>
+      <a:lnRef idx="0">
+        <a:scrgbClr r="0" g="0" b="0"/>
+      </a:lnRef>
+      <a:fillRef idx="1">
+        <a:scrgbClr r="0" g="0" b="0"/>
+      </a:fillRef>
+      <a:effectRef idx="0">
+        <a:scrgbClr r="0" g="0" b="0"/>
+      </a:effectRef>
+      <a:fontRef idx="minor">
+        <a:schemeClr val="lt1"/>
+      </a:fontRef>
+    </dgm:style>
+  </dgm:styleLbl>
+  <dgm:styleLbl name="sibTrans1D1">
+    <dgm:scene3d>
+      <a:camera prst="orthographicFront"/>
+      <a:lightRig rig="threePt" dir="t"/>
+    </dgm:scene3d>
+    <dgm:sp3d/>
+    <dgm:txPr/>
+    <dgm:style>
+      <a:lnRef idx="1">
+        <a:scrgbClr r="0" g="0" b="0"/>
+      </a:lnRef>
+      <a:fillRef idx="0">
+        <a:scrgbClr r="0" g="0" b="0"/>
+      </a:fillRef>
+      <a:effectRef idx="0">
+        <a:scrgbClr r="0" g="0" b="0"/>
+      </a:effectRef>
+      <a:fontRef idx="minor"/>
+    </dgm:style>
+  </dgm:styleLbl>
+  <dgm:styleLbl name="callout">
+    <dgm:scene3d>
+      <a:camera prst="orthographicFront"/>
+      <a:lightRig rig="threePt" dir="t"/>
+    </dgm:scene3d>
+    <dgm:sp3d/>
+    <dgm:txPr/>
+    <dgm:style>
+      <a:lnRef idx="2">
+        <a:scrgbClr r="0" g="0" b="0"/>
+      </a:lnRef>
+      <a:fillRef idx="1">
+        <a:scrgbClr r="0" g="0" b="0"/>
+      </a:fillRef>
+      <a:effectRef idx="0">
+        <a:scrgbClr r="0" g="0" b="0"/>
+      </a:effectRef>
+      <a:fontRef idx="minor"/>
+    </dgm:style>
+  </dgm:styleLbl>
+  <dgm:styleLbl name="asst0">
+    <dgm:scene3d>
+      <a:camera prst="orthographicFront"/>
+      <a:lightRig rig="threePt" dir="t"/>
+    </dgm:scene3d>
+    <dgm:sp3d/>
+    <dgm:txPr/>
+    <dgm:style>
+      <a:lnRef idx="2">
+        <a:scrgbClr r="0" g="0" b="0"/>
+      </a:lnRef>
+      <a:fillRef idx="1">
+        <a:scrgbClr r="0" g="0" b="0"/>
+      </a:fillRef>
+      <a:effectRef idx="0">
+        <a:scrgbClr r="0" g="0" b="0"/>
+      </a:effectRef>
+      <a:fontRef idx="minor">
+        <a:schemeClr val="lt1"/>
+      </a:fontRef>
+    </dgm:style>
+  </dgm:styleLbl>
+  <dgm:styleLbl name="asst1">
+    <dgm:scene3d>
+      <a:camera prst="orthographicFront"/>
+      <a:lightRig rig="threePt" dir="t"/>
+    </dgm:scene3d>
+    <dgm:sp3d/>
+    <dgm:txPr/>
+    <dgm:style>
+      <a:lnRef idx="2">
+        <a:scrgbClr r="0" g="0" b="0"/>
+      </a:lnRef>
+      <a:fillRef idx="1">
+        <a:scrgbClr r="0" g="0" b="0"/>
+      </a:fillRef>
+      <a:effectRef idx="0">
+        <a:scrgbClr r="0" g="0" b="0"/>
+      </a:effectRef>
+      <a:fontRef idx="minor">
+        <a:schemeClr val="lt1"/>
+      </a:fontRef>
+    </dgm:style>
+  </dgm:styleLbl>
+  <dgm:styleLbl name="asst2">
+    <dgm:scene3d>
+      <a:camera prst="orthographicFront"/>
+      <a:lightRig rig="threePt" dir="t"/>
+    </dgm:scene3d>
+    <dgm:sp3d/>
+    <dgm:txPr/>
+    <dgm:style>
+      <a:lnRef idx="2">
+        <a:scrgbClr r="0" g="0" b="0"/>
+      </a:lnRef>
+      <a:fillRef idx="1">
+        <a:scrgbClr r="0" g="0" b="0"/>
+      </a:fillRef>
+      <a:effectRef idx="0">
+        <a:scrgbClr r="0" g="0" b="0"/>
+      </a:effectRef>
+      <a:fontRef idx="minor">
+        <a:schemeClr val="lt1"/>
+      </a:fontRef>
+    </dgm:style>
+  </dgm:styleLbl>
+  <dgm:styleLbl name="asst3">
+    <dgm:scene3d>
+      <a:camera prst="orthographicFront"/>
+      <a:lightRig rig="threePt" dir="t"/>
+    </dgm:scene3d>
+    <dgm:sp3d/>
+    <dgm:txPr/>
+    <dgm:style>
+      <a:lnRef idx="2">
+        <a:scrgbClr r="0" g="0" b="0"/>
+      </a:lnRef>
+      <a:fillRef idx="1">
+        <a:scrgbClr r="0" g="0" b="0"/>
+      </a:fillRef>
+      <a:effectRef idx="0">
+        <a:scrgbClr r="0" g="0" b="0"/>
+      </a:effectRef>
+      <a:fontRef idx="minor">
+        <a:schemeClr val="lt1"/>
+      </a:fontRef>
+    </dgm:style>
+  </dgm:styleLbl>
+  <dgm:styleLbl name="asst4">
+    <dgm:scene3d>
+      <a:camera prst="orthographicFront"/>
+      <a:lightRig rig="threePt" dir="t"/>
+    </dgm:scene3d>
+    <dgm:sp3d/>
+    <dgm:txPr/>
+    <dgm:style>
+      <a:lnRef idx="2">
+        <a:scrgbClr r="0" g="0" b="0"/>
+      </a:lnRef>
+      <a:fillRef idx="1">
+        <a:scrgbClr r="0" g="0" b="0"/>
+      </a:fillRef>
+      <a:effectRef idx="0">
+        <a:scrgbClr r="0" g="0" b="0"/>
+      </a:effectRef>
+      <a:fontRef idx="minor">
+        <a:schemeClr val="lt1"/>
+      </a:fontRef>
+    </dgm:style>
+  </dgm:styleLbl>
+  <dgm:styleLbl name="parChTrans2D1">
+    <dgm:scene3d>
+      <a:camera prst="orthographicFront"/>
+      <a:lightRig rig="threePt" dir="t"/>
+    </dgm:scene3d>
+    <dgm:sp3d/>
+    <dgm:txPr/>
+    <dgm:style>
+      <a:lnRef idx="2">
+        <a:scrgbClr r="0" g="0" b="0"/>
+      </a:lnRef>
+      <a:fillRef idx="1">
+        <a:scrgbClr r="0" g="0" b="0"/>
+      </a:fillRef>
+      <a:effectRef idx="0">
+        <a:scrgbClr r="0" g="0" b="0"/>
+      </a:effectRef>
+      <a:fontRef idx="minor">
+        <a:schemeClr val="lt1"/>
+      </a:fontRef>
+    </dgm:style>
+  </dgm:styleLbl>
+  <dgm:styleLbl name="parChTrans2D2">
+    <dgm:scene3d>
+      <a:camera prst="orthographicFront"/>
+      <a:lightRig rig="threePt" dir="t"/>
+    </dgm:scene3d>
+    <dgm:sp3d/>
+    <dgm:txPr/>
+    <dgm:style>
+      <a:lnRef idx="2">
+        <a:scrgbClr r="0" g="0" b="0"/>
+      </a:lnRef>
+      <a:fillRef idx="1">
+        <a:scrgbClr r="0" g="0" b="0"/>
+      </a:fillRef>
+      <a:effectRef idx="0">
+        <a:scrgbClr r="0" g="0" b="0"/>
+      </a:effectRef>
+      <a:fontRef idx="minor">
+        <a:schemeClr val="lt1"/>
+      </a:fontRef>
+    </dgm:style>
+  </dgm:styleLbl>
+  <dgm:styleLbl name="parChTrans2D3">
+    <dgm:scene3d>
+      <a:camera prst="orthographicFront"/>
+      <a:lightRig rig="threePt" dir="t"/>
+    </dgm:scene3d>
+    <dgm:sp3d/>
+    <dgm:txPr/>
+    <dgm:style>
+      <a:lnRef idx="2">
+        <a:scrgbClr r="0" g="0" b="0"/>
+      </a:lnRef>
+      <a:fillRef idx="1">
+        <a:scrgbClr r="0" g="0" b="0"/>
+      </a:fillRef>
+      <a:effectRef idx="0">
+        <a:scrgbClr r="0" g="0" b="0"/>
+      </a:effectRef>
+      <a:fontRef idx="minor">
+        <a:schemeClr val="lt1"/>
+      </a:fontRef>
+    </dgm:style>
+  </dgm:styleLbl>
+  <dgm:styleLbl name="parChTrans2D4">
+    <dgm:scene3d>
+      <a:camera prst="orthographicFront"/>
+      <a:lightRig rig="threePt" dir="t"/>
+    </dgm:scene3d>
+    <dgm:sp3d/>
+    <dgm:txPr/>
+    <dgm:style>
+      <a:lnRef idx="2">
+        <a:scrgbClr r="0" g="0" b="0"/>
+      </a:lnRef>
+      <a:fillRef idx="1">
+        <a:scrgbClr r="0" g="0" b="0"/>
+      </a:fillRef>
+      <a:effectRef idx="0">
+        <a:scrgbClr r="0" g="0" b="0"/>
+      </a:effectRef>
+      <a:fontRef idx="minor">
+        <a:schemeClr val="lt1"/>
+      </a:fontRef>
+    </dgm:style>
+  </dgm:styleLbl>
+  <dgm:styleLbl name="parChTrans1D1">
+    <dgm:scene3d>
+      <a:camera prst="orthographicFront"/>
+      <a:lightRig rig="threePt" dir="t"/>
+    </dgm:scene3d>
+    <dgm:sp3d/>
+    <dgm:txPr/>
+    <dgm:style>
+      <a:lnRef idx="2">
+        <a:scrgbClr r="0" g="0" b="0"/>
+      </a:lnRef>
+      <a:fillRef idx="0">
+        <a:scrgbClr r="0" g="0" b="0"/>
+      </a:fillRef>
+      <a:effectRef idx="0">
+        <a:scrgbClr r="0" g="0" b="0"/>
+      </a:effectRef>
+      <a:fontRef idx="minor"/>
+    </dgm:style>
+  </dgm:styleLbl>
+  <dgm:styleLbl name="parChTrans1D2">
+    <dgm:scene3d>
+      <a:camera prst="orthographicFront"/>
+      <a:lightRig rig="threePt" dir="t"/>
+    </dgm:scene3d>
+    <dgm:sp3d/>
+    <dgm:txPr/>
+    <dgm:style>
+      <a:lnRef idx="2">
+        <a:scrgbClr r="0" g="0" b="0"/>
+      </a:lnRef>
+      <a:fillRef idx="0">
+        <a:scrgbClr r="0" g="0" b="0"/>
+      </a:fillRef>
+      <a:effectRef idx="0">
+        <a:scrgbClr r="0" g="0" b="0"/>
+      </a:effectRef>
+      <a:fontRef idx="minor"/>
+    </dgm:style>
+  </dgm:styleLbl>
+  <dgm:styleLbl name="parChTrans1D3">
+    <dgm:scene3d>
+      <a:camera prst="orthographicFront"/>
+      <a:lightRig rig="threePt" dir="t"/>
+    </dgm:scene3d>
+    <dgm:sp3d/>
+    <dgm:txPr/>
+    <dgm:style>
+      <a:lnRef idx="2">
+        <a:scrgbClr r="0" g="0" b="0"/>
+      </a:lnRef>
+      <a:fillRef idx="0">
+        <a:scrgbClr r="0" g="0" b="0"/>
+      </a:fillRef>
+      <a:effectRef idx="0">
+        <a:scrgbClr r="0" g="0" b="0"/>
+      </a:effectRef>
+      <a:fontRef idx="minor"/>
+    </dgm:style>
+  </dgm:styleLbl>
+  <dgm:styleLbl name="parChTrans1D4">
+    <dgm:scene3d>
+      <a:camera prst="orthographicFront"/>
+      <a:lightRig rig="threePt" dir="t"/>
+    </dgm:scene3d>
+    <dgm:sp3d/>
+    <dgm:txPr/>
+    <dgm:style>
+      <a:lnRef idx="2">
+        <a:scrgbClr r="0" g="0" b="0"/>
+      </a:lnRef>
+      <a:fillRef idx="0">
+        <a:scrgbClr r="0" g="0" b="0"/>
+      </a:fillRef>
+      <a:effectRef idx="0">
+        <a:scrgbClr r="0" g="0" b="0"/>
+      </a:effectRef>
+      <a:fontRef idx="minor"/>
+    </dgm:style>
+  </dgm:styleLbl>
+  <dgm:styleLbl name="fgAcc1">
+    <dgm:scene3d>
+      <a:camera prst="orthographicFront"/>
+      <a:lightRig rig="threePt" dir="t"/>
+    </dgm:scene3d>
+    <dgm:sp3d/>
+    <dgm:txPr/>
+    <dgm:style>
+      <a:lnRef idx="2">
+        <a:scrgbClr r="0" g="0" b="0"/>
+      </a:lnRef>
+      <a:fillRef idx="1">
+        <a:scrgbClr r="0" g="0" b="0"/>
+      </a:fillRef>
+      <a:effectRef idx="0">
+        <a:scrgbClr r="0" g="0" b="0"/>
+      </a:effectRef>
+      <a:fontRef idx="minor"/>
+    </dgm:style>
+  </dgm:styleLbl>
+  <dgm:styleLbl name="conFgAcc1">
+    <dgm:scene3d>
+      <a:camera prst="orthographicFront"/>
+      <a:lightRig rig="threePt" dir="t"/>
+    </dgm:scene3d>
+    <dgm:sp3d/>
+    <dgm:txPr/>
+    <dgm:style>
+      <a:lnRef idx="2">
+        <a:scrgbClr r="0" g="0" b="0"/>
+      </a:lnRef>
+      <a:fillRef idx="1">
+        <a:scrgbClr r="0" g="0" b="0"/>
+      </a:fillRef>
+      <a:effectRef idx="0">
+        <a:scrgbClr r="0" g="0" b="0"/>
+      </a:effectRef>
+      <a:fontRef idx="minor"/>
+    </dgm:style>
+  </dgm:styleLbl>
+  <dgm:styleLbl name="alignAcc1">
+    <dgm:scene3d>
+      <a:camera prst="orthographicFront"/>
+      <a:lightRig rig="threePt" dir="t"/>
+    </dgm:scene3d>
+    <dgm:sp3d/>
+    <dgm:txPr/>
+    <dgm:style>
+      <a:lnRef idx="2">
+        <a:scrgbClr r="0" g="0" b="0"/>
+      </a:lnRef>
+      <a:fillRef idx="1">
+        <a:scrgbClr r="0" g="0" b="0"/>
+      </a:fillRef>
+      <a:effectRef idx="0">
+        <a:scrgbClr r="0" g="0" b="0"/>
+      </a:effectRef>
+      <a:fontRef idx="minor"/>
+    </dgm:style>
+  </dgm:styleLbl>
+  <dgm:styleLbl name="trAlignAcc1">
+    <dgm:scene3d>
+      <a:camera prst="orthographicFront"/>
+      <a:lightRig rig="threePt" dir="t"/>
+    </dgm:scene3d>
+    <dgm:sp3d/>
+    <dgm:txPr/>
+    <dgm:style>
+      <a:lnRef idx="1">
+        <a:scrgbClr r="0" g="0" b="0"/>
+      </a:lnRef>
+      <a:fillRef idx="1">
+        <a:scrgbClr r="0" g="0" b="0"/>
+      </a:fillRef>
+      <a:effectRef idx="0">
+        <a:scrgbClr r="0" g="0" b="0"/>
+      </a:effectRef>
+      <a:fontRef idx="minor"/>
+    </dgm:style>
+  </dgm:styleLbl>
+  <dgm:styleLbl name="bgAcc1">
+    <dgm:scene3d>
+      <a:camera prst="orthographicFront"/>
+      <a:lightRig rig="threePt" dir="t"/>
+    </dgm:scene3d>
+    <dgm:sp3d/>
+    <dgm:txPr/>
+    <dgm:style>
+      <a:lnRef idx="2">
+        <a:scrgbClr r="0" g="0" b="0"/>
+      </a:lnRef>
+      <a:fillRef idx="1">
+        <a:scrgbClr r="0" g="0" b="0"/>
+      </a:fillRef>
+      <a:effectRef idx="0">
+        <a:scrgbClr r="0" g="0" b="0"/>
+      </a:effectRef>
+      <a:fontRef idx="minor"/>
+    </dgm:style>
+  </dgm:styleLbl>
+  <dgm:styleLbl name="solidFgAcc1">
+    <dgm:scene3d>
+      <a:camera prst="orthographicFront"/>
+      <a:lightRig rig="threePt" dir="t"/>
+    </dgm:scene3d>
+    <dgm:sp3d/>
+    <dgm:txPr/>
+    <dgm:style>
+      <a:lnRef idx="2">
+        <a:scrgbClr r="0" g="0" b="0"/>
+      </a:lnRef>
+      <a:fillRef idx="1">
+        <a:scrgbClr r="0" g="0" b="0"/>
+      </a:fillRef>
+      <a:effectRef idx="0">
+        <a:scrgbClr r="0" g="0" b="0"/>
+      </a:effectRef>
+      <a:fontRef idx="minor"/>
+    </dgm:style>
+  </dgm:styleLbl>
+  <dgm:styleLbl name="solidAlignAcc1">
+    <dgm:scene3d>
+      <a:camera prst="orthographicFront"/>
+      <a:lightRig rig="threePt" dir="t"/>
+    </dgm:scene3d>
+    <dgm:sp3d/>
+    <dgm:txPr/>
+    <dgm:style>
+      <a:lnRef idx="2">
+        <a:scrgbClr r="0" g="0" b="0"/>
+      </a:lnRef>
+      <a:fillRef idx="1">
+        <a:scrgbClr r="0" g="0" b="0"/>
+      </a:fillRef>
+      <a:effectRef idx="0">
+        <a:scrgbClr r="0" g="0" b="0"/>
+      </a:effectRef>
+      <a:fontRef idx="minor"/>
+    </dgm:style>
+  </dgm:styleLbl>
+  <dgm:styleLbl name="solidBgAcc1">
+    <dgm:scene3d>
+      <a:camera prst="orthographicFront"/>
+      <a:lightRig rig="threePt" dir="t"/>
+    </dgm:scene3d>
+    <dgm:sp3d/>
+    <dgm:txPr/>
+    <dgm:style>
+      <a:lnRef idx="2">
+        <a:scrgbClr r="0" g="0" b="0"/>
+      </a:lnRef>
+      <a:fillRef idx="1">
+        <a:scrgbClr r="0" g="0" b="0"/>
+      </a:fillRef>
+      <a:effectRef idx="0">
+        <a:scrgbClr r="0" g="0" b="0"/>
+      </a:effectRef>
+      <a:fontRef idx="minor"/>
+    </dgm:style>
+  </dgm:styleLbl>
+  <dgm:styleLbl name="fgAccFollowNode1">
+    <dgm:scene3d>
+      <a:camera prst="orthographicFront"/>
+      <a:lightRig rig="threePt" dir="t"/>
+    </dgm:scene3d>
+    <dgm:sp3d/>
+    <dgm:txPr/>
+    <dgm:style>
+      <a:lnRef idx="2">
+        <a:scrgbClr r="0" g="0" b="0"/>
+      </a:lnRef>
+      <a:fillRef idx="1">
+        <a:scrgbClr r="0" g="0" b="0"/>
+      </a:fillRef>
+      <a:effectRef idx="0">
+        <a:scrgbClr r="0" g="0" b="0"/>
+      </a:effectRef>
+      <a:fontRef idx="minor"/>
+    </dgm:style>
+  </dgm:styleLbl>
+  <dgm:styleLbl name="alignAccFollowNode1">
+    <dgm:scene3d>
+      <a:camera prst="orthographicFront"/>
+      <a:lightRig rig="threePt" dir="t"/>
+    </dgm:scene3d>
+    <dgm:sp3d/>
+    <dgm:txPr/>
+    <dgm:style>
+      <a:lnRef idx="2">
+        <a:scrgbClr r="0" g="0" b="0"/>
+      </a:lnRef>
+      <a:fillRef idx="1">
+        <a:scrgbClr r="0" g="0" b="0"/>
+      </a:fillRef>
+      <a:effectRef idx="0">
+        <a:scrgbClr r="0" g="0" b="0"/>
+      </a:effectRef>
+      <a:fontRef idx="minor"/>
+    </dgm:style>
+  </dgm:styleLbl>
+  <dgm:styleLbl name="bgAccFollowNode1">
+    <dgm:scene3d>
+      <a:camera prst="orthographicFront"/>
+      <a:lightRig rig="threePt" dir="t"/>
+    </dgm:scene3d>
+    <dgm:sp3d/>
+    <dgm:txPr/>
+    <dgm:style>
+      <a:lnRef idx="2">
+        <a:scrgbClr r="0" g="0" b="0"/>
+      </a:lnRef>
+      <a:fillRef idx="1">
+        <a:scrgbClr r="0" g="0" b="0"/>
+      </a:fillRef>
+      <a:effectRef idx="0">
+        <a:scrgbClr r="0" g="0" b="0"/>
+      </a:effectRef>
+      <a:fontRef idx="minor"/>
+    </dgm:style>
+  </dgm:styleLbl>
+  <dgm:styleLbl name="fgAcc0">
+    <dgm:scene3d>
+      <a:camera prst="orthographicFront"/>
+      <a:lightRig rig="threePt" dir="t"/>
+    </dgm:scene3d>
+    <dgm:sp3d/>
+    <dgm:txPr/>
+    <dgm:style>
+      <a:lnRef idx="2">
+        <a:scrgbClr r="0" g="0" b="0"/>
+      </a:lnRef>
+      <a:fillRef idx="1">
+        <a:scrgbClr r="0" g="0" b="0"/>
+      </a:fillRef>
+      <a:effectRef idx="0">
+        <a:scrgbClr r="0" g="0" b="0"/>
+      </a:effectRef>
+      <a:fontRef idx="minor"/>
+    </dgm:style>
+  </dgm:styleLbl>
+  <dgm:styleLbl name="fgAcc2">
+    <dgm:scene3d>
+      <a:camera prst="orthographicFront"/>
+      <a:lightRig rig="threePt" dir="t"/>
+    </dgm:scene3d>
+    <dgm:sp3d/>
+    <dgm:txPr/>
+    <dgm:style>
+      <a:lnRef idx="2">
+        <a:scrgbClr r="0" g="0" b="0"/>
+      </a:lnRef>
+      <a:fillRef idx="1">
+        <a:scrgbClr r="0" g="0" b="0"/>
+      </a:fillRef>
+      <a:effectRef idx="0">
+        <a:scrgbClr r="0" g="0" b="0"/>
+      </a:effectRef>
+      <a:fontRef idx="minor"/>
+    </dgm:style>
+  </dgm:styleLbl>
+  <dgm:styleLbl name="fgAcc3">
+    <dgm:scene3d>
+      <a:camera prst="orthographicFront"/>
+      <a:lightRig rig="threePt" dir="t"/>
+    </dgm:scene3d>
+    <dgm:sp3d/>
+    <dgm:txPr/>
+    <dgm:style>
+      <a:lnRef idx="2">
+        <a:scrgbClr r="0" g="0" b="0"/>
+      </a:lnRef>
+      <a:fillRef idx="1">
+        <a:scrgbClr r="0" g="0" b="0"/>
+      </a:fillRef>
+      <a:effectRef idx="0">
+        <a:scrgbClr r="0" g="0" b="0"/>
+      </a:effectRef>
+      <a:fontRef idx="minor"/>
+    </dgm:style>
+  </dgm:styleLbl>
+  <dgm:styleLbl name="fgAcc4">
+    <dgm:scene3d>
+      <a:camera prst="orthographicFront"/>
+      <a:lightRig rig="threePt" dir="t"/>
+    </dgm:scene3d>
+    <dgm:sp3d/>
+    <dgm:txPr/>
+    <dgm:style>
+      <a:lnRef idx="2">
+        <a:scrgbClr r="0" g="0" b="0"/>
+      </a:lnRef>
+      <a:fillRef idx="1">
+        <a:scrgbClr r="0" g="0" b="0"/>
+      </a:fillRef>
+      <a:effectRef idx="0">
+        <a:scrgbClr r="0" g="0" b="0"/>
+      </a:effectRef>
+      <a:fontRef idx="minor"/>
+    </dgm:style>
+  </dgm:styleLbl>
+  <dgm:styleLbl name="bgShp">
+    <dgm:scene3d>
+      <a:camera prst="orthographicFront"/>
+      <a:lightRig rig="threePt" dir="t"/>
+    </dgm:scene3d>
+    <dgm:sp3d/>
+    <dgm:txPr/>
+    <dgm:style>
+      <a:lnRef idx="0">
+        <a:scrgbClr r="0" g="0" b="0"/>
+      </a:lnRef>
+      <a:fillRef idx="1">
+        <a:scrgbClr r="0" g="0" b="0"/>
+      </a:fillRef>
+      <a:effectRef idx="0">
+        <a:scrgbClr r="0" g="0" b="0"/>
+      </a:effectRef>
+      <a:fontRef idx="minor"/>
+    </dgm:style>
+  </dgm:styleLbl>
+  <dgm:styleLbl name="dkBgShp">
+    <dgm:scene3d>
+      <a:camera prst="orthographicFront"/>
+      <a:lightRig rig="threePt" dir="t"/>
+    </dgm:scene3d>
+    <dgm:sp3d/>
+    <dgm:txPr/>
+    <dgm:style>
+      <a:lnRef idx="0">
+        <a:scrgbClr r="0" g="0" b="0"/>
+      </a:lnRef>
+      <a:fillRef idx="1">
+        <a:scrgbClr r="0" g="0" b="0"/>
+      </a:fillRef>
+      <a:effectRef idx="0">
+        <a:scrgbClr r="0" g="0" b="0"/>
+      </a:effectRef>
+      <a:fontRef idx="minor"/>
+    </dgm:style>
+  </dgm:styleLbl>
+  <dgm:styleLbl name="trBgShp">
+    <dgm:scene3d>
+      <a:camera prst="orthographicFront"/>
+      <a:lightRig rig="threePt" dir="t"/>
+    </dgm:scene3d>
+    <dgm:sp3d/>
+    <dgm:txPr/>
+    <dgm:style>
+      <a:lnRef idx="0">
+        <a:scrgbClr r="0" g="0" b="0"/>
+      </a:lnRef>
+      <a:fillRef idx="1">
+        <a:scrgbClr r="0" g="0" b="0"/>
+      </a:fillRef>
+      <a:effectRef idx="0">
+        <a:scrgbClr r="0" g="0" b="0"/>
+      </a:effectRef>
+      <a:fontRef idx="minor"/>
+    </dgm:style>
+  </dgm:styleLbl>
+  <dgm:styleLbl name="fgShp">
+    <dgm:scene3d>
+      <a:camera prst="orthographicFront"/>
+      <a:lightRig rig="threePt" dir="t"/>
+    </dgm:scene3d>
+    <dgm:sp3d/>
+    <dgm:txPr/>
+    <dgm:style>
+      <a:lnRef idx="2">
+        <a:scrgbClr r="0" g="0" b="0"/>
+      </a:lnRef>
+      <a:fillRef idx="1">
+        <a:scrgbClr r="0" g="0" b="0"/>
+      </a:fillRef>
+      <a:effectRef idx="0">
+        <a:scrgbClr r="0" g="0" b="0"/>
+      </a:effectRef>
+      <a:fontRef idx="minor"/>
+    </dgm:style>
+  </dgm:styleLbl>
+  <dgm:styleLbl name="revTx">
+    <dgm:scene3d>
+      <a:camera prst="orthographicFront"/>
+      <a:lightRig rig="threePt" dir="t"/>
+    </dgm:scene3d>
+    <dgm:sp3d/>
+    <dgm:txPr/>
+    <dgm:style>
+      <a:lnRef idx="0">
+        <a:scrgbClr r="0" g="0" b="0"/>
+      </a:lnRef>
+      <a:fillRef idx="0">
+        <a:scrgbClr r="0" g="0" b="0"/>
+      </a:fillRef>
+      <a:effectRef idx="0">
+        <a:scrgbClr r="0" g="0" b="0"/>
+      </a:effectRef>
+      <a:fontRef idx="minor"/>
+    </dgm:style>
+  </dgm:styleLbl>
+</dgm:styleDef>
+</file>
+
 <file path=ppt/diagrams/quickStyle3.xml><?xml version="1.0" encoding="utf-8"?>
 <dgm:styleDef xmlns:dgm="http://schemas.openxmlformats.org/drawingml/2006/diagram" xmlns:a="http://schemas.openxmlformats.org/drawingml/2006/main" uniqueId="urn:microsoft.com/office/officeart/2005/8/quickstyle/simple1">
   <dgm:title val=""/>
@@ -10365,1040 +11399,6 @@
 </file>
 
 <file path=ppt/diagrams/quickStyle4.xml><?xml version="1.0" encoding="utf-8"?>
-<dgm:styleDef xmlns:dgm="http://schemas.openxmlformats.org/drawingml/2006/diagram" xmlns:a="http://schemas.openxmlformats.org/drawingml/2006/main" uniqueId="urn:microsoft.com/office/officeart/2005/8/quickstyle/simple1">
-  <dgm:title val=""/>
-  <dgm:desc val=""/>
-  <dgm:catLst>
-    <dgm:cat type="simple" pri="10100"/>
-  </dgm:catLst>
-  <dgm:scene3d>
-    <a:camera prst="orthographicFront"/>
-    <a:lightRig rig="threePt" dir="t"/>
-  </dgm:scene3d>
-  <dgm:styleLbl name="node0">
-    <dgm:scene3d>
-      <a:camera prst="orthographicFront"/>
-      <a:lightRig rig="threePt" dir="t"/>
-    </dgm:scene3d>
-    <dgm:sp3d/>
-    <dgm:txPr/>
-    <dgm:style>
-      <a:lnRef idx="2">
-        <a:scrgbClr r="0" g="0" b="0"/>
-      </a:lnRef>
-      <a:fillRef idx="1">
-        <a:scrgbClr r="0" g="0" b="0"/>
-      </a:fillRef>
-      <a:effectRef idx="0">
-        <a:scrgbClr r="0" g="0" b="0"/>
-      </a:effectRef>
-      <a:fontRef idx="minor">
-        <a:schemeClr val="lt1"/>
-      </a:fontRef>
-    </dgm:style>
-  </dgm:styleLbl>
-  <dgm:styleLbl name="lnNode1">
-    <dgm:scene3d>
-      <a:camera prst="orthographicFront"/>
-      <a:lightRig rig="threePt" dir="t"/>
-    </dgm:scene3d>
-    <dgm:sp3d/>
-    <dgm:txPr/>
-    <dgm:style>
-      <a:lnRef idx="2">
-        <a:scrgbClr r="0" g="0" b="0"/>
-      </a:lnRef>
-      <a:fillRef idx="1">
-        <a:scrgbClr r="0" g="0" b="0"/>
-      </a:fillRef>
-      <a:effectRef idx="0">
-        <a:scrgbClr r="0" g="0" b="0"/>
-      </a:effectRef>
-      <a:fontRef idx="minor">
-        <a:schemeClr val="lt1"/>
-      </a:fontRef>
-    </dgm:style>
-  </dgm:styleLbl>
-  <dgm:styleLbl name="vennNode1">
-    <dgm:scene3d>
-      <a:camera prst="orthographicFront"/>
-      <a:lightRig rig="threePt" dir="t"/>
-    </dgm:scene3d>
-    <dgm:sp3d/>
-    <dgm:txPr/>
-    <dgm:style>
-      <a:lnRef idx="2">
-        <a:scrgbClr r="0" g="0" b="0"/>
-      </a:lnRef>
-      <a:fillRef idx="1">
-        <a:scrgbClr r="0" g="0" b="0"/>
-      </a:fillRef>
-      <a:effectRef idx="0">
-        <a:scrgbClr r="0" g="0" b="0"/>
-      </a:effectRef>
-      <a:fontRef idx="minor">
-        <a:schemeClr val="tx1"/>
-      </a:fontRef>
-    </dgm:style>
-  </dgm:styleLbl>
-  <dgm:styleLbl name="alignNode1">
-    <dgm:scene3d>
-      <a:camera prst="orthographicFront"/>
-      <a:lightRig rig="threePt" dir="t"/>
-    </dgm:scene3d>
-    <dgm:sp3d/>
-    <dgm:txPr/>
-    <dgm:style>
-      <a:lnRef idx="2">
-        <a:scrgbClr r="0" g="0" b="0"/>
-      </a:lnRef>
-      <a:fillRef idx="1">
-        <a:scrgbClr r="0" g="0" b="0"/>
-      </a:fillRef>
-      <a:effectRef idx="0">
-        <a:scrgbClr r="0" g="0" b="0"/>
-      </a:effectRef>
-      <a:fontRef idx="minor">
-        <a:schemeClr val="lt1"/>
-      </a:fontRef>
-    </dgm:style>
-  </dgm:styleLbl>
-  <dgm:styleLbl name="node1">
-    <dgm:scene3d>
-      <a:camera prst="orthographicFront"/>
-      <a:lightRig rig="threePt" dir="t"/>
-    </dgm:scene3d>
-    <dgm:sp3d/>
-    <dgm:txPr/>
-    <dgm:style>
-      <a:lnRef idx="2">
-        <a:scrgbClr r="0" g="0" b="0"/>
-      </a:lnRef>
-      <a:fillRef idx="1">
-        <a:scrgbClr r="0" g="0" b="0"/>
-      </a:fillRef>
-      <a:effectRef idx="0">
-        <a:scrgbClr r="0" g="0" b="0"/>
-      </a:effectRef>
-      <a:fontRef idx="minor">
-        <a:schemeClr val="lt1"/>
-      </a:fontRef>
-    </dgm:style>
-  </dgm:styleLbl>
-  <dgm:styleLbl name="node2">
-    <dgm:scene3d>
-      <a:camera prst="orthographicFront"/>
-      <a:lightRig rig="threePt" dir="t"/>
-    </dgm:scene3d>
-    <dgm:sp3d/>
-    <dgm:txPr/>
-    <dgm:style>
-      <a:lnRef idx="2">
-        <a:scrgbClr r="0" g="0" b="0"/>
-      </a:lnRef>
-      <a:fillRef idx="1">
-        <a:scrgbClr r="0" g="0" b="0"/>
-      </a:fillRef>
-      <a:effectRef idx="0">
-        <a:scrgbClr r="0" g="0" b="0"/>
-      </a:effectRef>
-      <a:fontRef idx="minor">
-        <a:schemeClr val="lt1"/>
-      </a:fontRef>
-    </dgm:style>
-  </dgm:styleLbl>
-  <dgm:styleLbl name="node3">
-    <dgm:scene3d>
-      <a:camera prst="orthographicFront"/>
-      <a:lightRig rig="threePt" dir="t"/>
-    </dgm:scene3d>
-    <dgm:sp3d/>
-    <dgm:txPr/>
-    <dgm:style>
-      <a:lnRef idx="2">
-        <a:scrgbClr r="0" g="0" b="0"/>
-      </a:lnRef>
-      <a:fillRef idx="1">
-        <a:scrgbClr r="0" g="0" b="0"/>
-      </a:fillRef>
-      <a:effectRef idx="0">
-        <a:scrgbClr r="0" g="0" b="0"/>
-      </a:effectRef>
-      <a:fontRef idx="minor">
-        <a:schemeClr val="lt1"/>
-      </a:fontRef>
-    </dgm:style>
-  </dgm:styleLbl>
-  <dgm:styleLbl name="node4">
-    <dgm:scene3d>
-      <a:camera prst="orthographicFront"/>
-      <a:lightRig rig="threePt" dir="t"/>
-    </dgm:scene3d>
-    <dgm:sp3d/>
-    <dgm:txPr/>
-    <dgm:style>
-      <a:lnRef idx="2">
-        <a:scrgbClr r="0" g="0" b="0"/>
-      </a:lnRef>
-      <a:fillRef idx="1">
-        <a:scrgbClr r="0" g="0" b="0"/>
-      </a:fillRef>
-      <a:effectRef idx="0">
-        <a:scrgbClr r="0" g="0" b="0"/>
-      </a:effectRef>
-      <a:fontRef idx="minor">
-        <a:schemeClr val="lt1"/>
-      </a:fontRef>
-    </dgm:style>
-  </dgm:styleLbl>
-  <dgm:styleLbl name="fgImgPlace1">
-    <dgm:scene3d>
-      <a:camera prst="orthographicFront"/>
-      <a:lightRig rig="threePt" dir="t"/>
-    </dgm:scene3d>
-    <dgm:sp3d/>
-    <dgm:txPr/>
-    <dgm:style>
-      <a:lnRef idx="2">
-        <a:scrgbClr r="0" g="0" b="0"/>
-      </a:lnRef>
-      <a:fillRef idx="1">
-        <a:scrgbClr r="0" g="0" b="0"/>
-      </a:fillRef>
-      <a:effectRef idx="0">
-        <a:scrgbClr r="0" g="0" b="0"/>
-      </a:effectRef>
-      <a:fontRef idx="minor"/>
-    </dgm:style>
-  </dgm:styleLbl>
-  <dgm:styleLbl name="alignImgPlace1">
-    <dgm:scene3d>
-      <a:camera prst="orthographicFront"/>
-      <a:lightRig rig="threePt" dir="t"/>
-    </dgm:scene3d>
-    <dgm:sp3d/>
-    <dgm:txPr/>
-    <dgm:style>
-      <a:lnRef idx="2">
-        <a:scrgbClr r="0" g="0" b="0"/>
-      </a:lnRef>
-      <a:fillRef idx="1">
-        <a:scrgbClr r="0" g="0" b="0"/>
-      </a:fillRef>
-      <a:effectRef idx="0">
-        <a:scrgbClr r="0" g="0" b="0"/>
-      </a:effectRef>
-      <a:fontRef idx="minor"/>
-    </dgm:style>
-  </dgm:styleLbl>
-  <dgm:styleLbl name="bgImgPlace1">
-    <dgm:scene3d>
-      <a:camera prst="orthographicFront"/>
-      <a:lightRig rig="threePt" dir="t"/>
-    </dgm:scene3d>
-    <dgm:sp3d/>
-    <dgm:txPr/>
-    <dgm:style>
-      <a:lnRef idx="2">
-        <a:scrgbClr r="0" g="0" b="0"/>
-      </a:lnRef>
-      <a:fillRef idx="1">
-        <a:scrgbClr r="0" g="0" b="0"/>
-      </a:fillRef>
-      <a:effectRef idx="0">
-        <a:scrgbClr r="0" g="0" b="0"/>
-      </a:effectRef>
-      <a:fontRef idx="minor"/>
-    </dgm:style>
-  </dgm:styleLbl>
-  <dgm:styleLbl name="sibTrans2D1">
-    <dgm:scene3d>
-      <a:camera prst="orthographicFront"/>
-      <a:lightRig rig="threePt" dir="t"/>
-    </dgm:scene3d>
-    <dgm:sp3d/>
-    <dgm:txPr/>
-    <dgm:style>
-      <a:lnRef idx="0">
-        <a:scrgbClr r="0" g="0" b="0"/>
-      </a:lnRef>
-      <a:fillRef idx="1">
-        <a:scrgbClr r="0" g="0" b="0"/>
-      </a:fillRef>
-      <a:effectRef idx="0">
-        <a:scrgbClr r="0" g="0" b="0"/>
-      </a:effectRef>
-      <a:fontRef idx="minor">
-        <a:schemeClr val="lt1"/>
-      </a:fontRef>
-    </dgm:style>
-  </dgm:styleLbl>
-  <dgm:styleLbl name="fgSibTrans2D1">
-    <dgm:scene3d>
-      <a:camera prst="orthographicFront"/>
-      <a:lightRig rig="threePt" dir="t"/>
-    </dgm:scene3d>
-    <dgm:sp3d/>
-    <dgm:txPr/>
-    <dgm:style>
-      <a:lnRef idx="0">
-        <a:scrgbClr r="0" g="0" b="0"/>
-      </a:lnRef>
-      <a:fillRef idx="1">
-        <a:scrgbClr r="0" g="0" b="0"/>
-      </a:fillRef>
-      <a:effectRef idx="0">
-        <a:scrgbClr r="0" g="0" b="0"/>
-      </a:effectRef>
-      <a:fontRef idx="minor">
-        <a:schemeClr val="lt1"/>
-      </a:fontRef>
-    </dgm:style>
-  </dgm:styleLbl>
-  <dgm:styleLbl name="bgSibTrans2D1">
-    <dgm:scene3d>
-      <a:camera prst="orthographicFront"/>
-      <a:lightRig rig="threePt" dir="t"/>
-    </dgm:scene3d>
-    <dgm:sp3d/>
-    <dgm:txPr/>
-    <dgm:style>
-      <a:lnRef idx="0">
-        <a:scrgbClr r="0" g="0" b="0"/>
-      </a:lnRef>
-      <a:fillRef idx="1">
-        <a:scrgbClr r="0" g="0" b="0"/>
-      </a:fillRef>
-      <a:effectRef idx="0">
-        <a:scrgbClr r="0" g="0" b="0"/>
-      </a:effectRef>
-      <a:fontRef idx="minor">
-        <a:schemeClr val="lt1"/>
-      </a:fontRef>
-    </dgm:style>
-  </dgm:styleLbl>
-  <dgm:styleLbl name="sibTrans1D1">
-    <dgm:scene3d>
-      <a:camera prst="orthographicFront"/>
-      <a:lightRig rig="threePt" dir="t"/>
-    </dgm:scene3d>
-    <dgm:sp3d/>
-    <dgm:txPr/>
-    <dgm:style>
-      <a:lnRef idx="1">
-        <a:scrgbClr r="0" g="0" b="0"/>
-      </a:lnRef>
-      <a:fillRef idx="0">
-        <a:scrgbClr r="0" g="0" b="0"/>
-      </a:fillRef>
-      <a:effectRef idx="0">
-        <a:scrgbClr r="0" g="0" b="0"/>
-      </a:effectRef>
-      <a:fontRef idx="minor"/>
-    </dgm:style>
-  </dgm:styleLbl>
-  <dgm:styleLbl name="callout">
-    <dgm:scene3d>
-      <a:camera prst="orthographicFront"/>
-      <a:lightRig rig="threePt" dir="t"/>
-    </dgm:scene3d>
-    <dgm:sp3d/>
-    <dgm:txPr/>
-    <dgm:style>
-      <a:lnRef idx="2">
-        <a:scrgbClr r="0" g="0" b="0"/>
-      </a:lnRef>
-      <a:fillRef idx="1">
-        <a:scrgbClr r="0" g="0" b="0"/>
-      </a:fillRef>
-      <a:effectRef idx="0">
-        <a:scrgbClr r="0" g="0" b="0"/>
-      </a:effectRef>
-      <a:fontRef idx="minor"/>
-    </dgm:style>
-  </dgm:styleLbl>
-  <dgm:styleLbl name="asst0">
-    <dgm:scene3d>
-      <a:camera prst="orthographicFront"/>
-      <a:lightRig rig="threePt" dir="t"/>
-    </dgm:scene3d>
-    <dgm:sp3d/>
-    <dgm:txPr/>
-    <dgm:style>
-      <a:lnRef idx="2">
-        <a:scrgbClr r="0" g="0" b="0"/>
-      </a:lnRef>
-      <a:fillRef idx="1">
-        <a:scrgbClr r="0" g="0" b="0"/>
-      </a:fillRef>
-      <a:effectRef idx="0">
-        <a:scrgbClr r="0" g="0" b="0"/>
-      </a:effectRef>
-      <a:fontRef idx="minor">
-        <a:schemeClr val="lt1"/>
-      </a:fontRef>
-    </dgm:style>
-  </dgm:styleLbl>
-  <dgm:styleLbl name="asst1">
-    <dgm:scene3d>
-      <a:camera prst="orthographicFront"/>
-      <a:lightRig rig="threePt" dir="t"/>
-    </dgm:scene3d>
-    <dgm:sp3d/>
-    <dgm:txPr/>
-    <dgm:style>
-      <a:lnRef idx="2">
-        <a:scrgbClr r="0" g="0" b="0"/>
-      </a:lnRef>
-      <a:fillRef idx="1">
-        <a:scrgbClr r="0" g="0" b="0"/>
-      </a:fillRef>
-      <a:effectRef idx="0">
-        <a:scrgbClr r="0" g="0" b="0"/>
-      </a:effectRef>
-      <a:fontRef idx="minor">
-        <a:schemeClr val="lt1"/>
-      </a:fontRef>
-    </dgm:style>
-  </dgm:styleLbl>
-  <dgm:styleLbl name="asst2">
-    <dgm:scene3d>
-      <a:camera prst="orthographicFront"/>
-      <a:lightRig rig="threePt" dir="t"/>
-    </dgm:scene3d>
-    <dgm:sp3d/>
-    <dgm:txPr/>
-    <dgm:style>
-      <a:lnRef idx="2">
-        <a:scrgbClr r="0" g="0" b="0"/>
-      </a:lnRef>
-      <a:fillRef idx="1">
-        <a:scrgbClr r="0" g="0" b="0"/>
-      </a:fillRef>
-      <a:effectRef idx="0">
-        <a:scrgbClr r="0" g="0" b="0"/>
-      </a:effectRef>
-      <a:fontRef idx="minor">
-        <a:schemeClr val="lt1"/>
-      </a:fontRef>
-    </dgm:style>
-  </dgm:styleLbl>
-  <dgm:styleLbl name="asst3">
-    <dgm:scene3d>
-      <a:camera prst="orthographicFront"/>
-      <a:lightRig rig="threePt" dir="t"/>
-    </dgm:scene3d>
-    <dgm:sp3d/>
-    <dgm:txPr/>
-    <dgm:style>
-      <a:lnRef idx="2">
-        <a:scrgbClr r="0" g="0" b="0"/>
-      </a:lnRef>
-      <a:fillRef idx="1">
-        <a:scrgbClr r="0" g="0" b="0"/>
-      </a:fillRef>
-      <a:effectRef idx="0">
-        <a:scrgbClr r="0" g="0" b="0"/>
-      </a:effectRef>
-      <a:fontRef idx="minor">
-        <a:schemeClr val="lt1"/>
-      </a:fontRef>
-    </dgm:style>
-  </dgm:styleLbl>
-  <dgm:styleLbl name="asst4">
-    <dgm:scene3d>
-      <a:camera prst="orthographicFront"/>
-      <a:lightRig rig="threePt" dir="t"/>
-    </dgm:scene3d>
-    <dgm:sp3d/>
-    <dgm:txPr/>
-    <dgm:style>
-      <a:lnRef idx="2">
-        <a:scrgbClr r="0" g="0" b="0"/>
-      </a:lnRef>
-      <a:fillRef idx="1">
-        <a:scrgbClr r="0" g="0" b="0"/>
-      </a:fillRef>
-      <a:effectRef idx="0">
-        <a:scrgbClr r="0" g="0" b="0"/>
-      </a:effectRef>
-      <a:fontRef idx="minor">
-        <a:schemeClr val="lt1"/>
-      </a:fontRef>
-    </dgm:style>
-  </dgm:styleLbl>
-  <dgm:styleLbl name="parChTrans2D1">
-    <dgm:scene3d>
-      <a:camera prst="orthographicFront"/>
-      <a:lightRig rig="threePt" dir="t"/>
-    </dgm:scene3d>
-    <dgm:sp3d/>
-    <dgm:txPr/>
-    <dgm:style>
-      <a:lnRef idx="2">
-        <a:scrgbClr r="0" g="0" b="0"/>
-      </a:lnRef>
-      <a:fillRef idx="1">
-        <a:scrgbClr r="0" g="0" b="0"/>
-      </a:fillRef>
-      <a:effectRef idx="0">
-        <a:scrgbClr r="0" g="0" b="0"/>
-      </a:effectRef>
-      <a:fontRef idx="minor">
-        <a:schemeClr val="lt1"/>
-      </a:fontRef>
-    </dgm:style>
-  </dgm:styleLbl>
-  <dgm:styleLbl name="parChTrans2D2">
-    <dgm:scene3d>
-      <a:camera prst="orthographicFront"/>
-      <a:lightRig rig="threePt" dir="t"/>
-    </dgm:scene3d>
-    <dgm:sp3d/>
-    <dgm:txPr/>
-    <dgm:style>
-      <a:lnRef idx="2">
-        <a:scrgbClr r="0" g="0" b="0"/>
-      </a:lnRef>
-      <a:fillRef idx="1">
-        <a:scrgbClr r="0" g="0" b="0"/>
-      </a:fillRef>
-      <a:effectRef idx="0">
-        <a:scrgbClr r="0" g="0" b="0"/>
-      </a:effectRef>
-      <a:fontRef idx="minor">
-        <a:schemeClr val="lt1"/>
-      </a:fontRef>
-    </dgm:style>
-  </dgm:styleLbl>
-  <dgm:styleLbl name="parChTrans2D3">
-    <dgm:scene3d>
-      <a:camera prst="orthographicFront"/>
-      <a:lightRig rig="threePt" dir="t"/>
-    </dgm:scene3d>
-    <dgm:sp3d/>
-    <dgm:txPr/>
-    <dgm:style>
-      <a:lnRef idx="2">
-        <a:scrgbClr r="0" g="0" b="0"/>
-      </a:lnRef>
-      <a:fillRef idx="1">
-        <a:scrgbClr r="0" g="0" b="0"/>
-      </a:fillRef>
-      <a:effectRef idx="0">
-        <a:scrgbClr r="0" g="0" b="0"/>
-      </a:effectRef>
-      <a:fontRef idx="minor">
-        <a:schemeClr val="lt1"/>
-      </a:fontRef>
-    </dgm:style>
-  </dgm:styleLbl>
-  <dgm:styleLbl name="parChTrans2D4">
-    <dgm:scene3d>
-      <a:camera prst="orthographicFront"/>
-      <a:lightRig rig="threePt" dir="t"/>
-    </dgm:scene3d>
-    <dgm:sp3d/>
-    <dgm:txPr/>
-    <dgm:style>
-      <a:lnRef idx="2">
-        <a:scrgbClr r="0" g="0" b="0"/>
-      </a:lnRef>
-      <a:fillRef idx="1">
-        <a:scrgbClr r="0" g="0" b="0"/>
-      </a:fillRef>
-      <a:effectRef idx="0">
-        <a:scrgbClr r="0" g="0" b="0"/>
-      </a:effectRef>
-      <a:fontRef idx="minor">
-        <a:schemeClr val="lt1"/>
-      </a:fontRef>
-    </dgm:style>
-  </dgm:styleLbl>
-  <dgm:styleLbl name="parChTrans1D1">
-    <dgm:scene3d>
-      <a:camera prst="orthographicFront"/>
-      <a:lightRig rig="threePt" dir="t"/>
-    </dgm:scene3d>
-    <dgm:sp3d/>
-    <dgm:txPr/>
-    <dgm:style>
-      <a:lnRef idx="2">
-        <a:scrgbClr r="0" g="0" b="0"/>
-      </a:lnRef>
-      <a:fillRef idx="0">
-        <a:scrgbClr r="0" g="0" b="0"/>
-      </a:fillRef>
-      <a:effectRef idx="0">
-        <a:scrgbClr r="0" g="0" b="0"/>
-      </a:effectRef>
-      <a:fontRef idx="minor"/>
-    </dgm:style>
-  </dgm:styleLbl>
-  <dgm:styleLbl name="parChTrans1D2">
-    <dgm:scene3d>
-      <a:camera prst="orthographicFront"/>
-      <a:lightRig rig="threePt" dir="t"/>
-    </dgm:scene3d>
-    <dgm:sp3d/>
-    <dgm:txPr/>
-    <dgm:style>
-      <a:lnRef idx="2">
-        <a:scrgbClr r="0" g="0" b="0"/>
-      </a:lnRef>
-      <a:fillRef idx="0">
-        <a:scrgbClr r="0" g="0" b="0"/>
-      </a:fillRef>
-      <a:effectRef idx="0">
-        <a:scrgbClr r="0" g="0" b="0"/>
-      </a:effectRef>
-      <a:fontRef idx="minor"/>
-    </dgm:style>
-  </dgm:styleLbl>
-  <dgm:styleLbl name="parChTrans1D3">
-    <dgm:scene3d>
-      <a:camera prst="orthographicFront"/>
-      <a:lightRig rig="threePt" dir="t"/>
-    </dgm:scene3d>
-    <dgm:sp3d/>
-    <dgm:txPr/>
-    <dgm:style>
-      <a:lnRef idx="2">
-        <a:scrgbClr r="0" g="0" b="0"/>
-      </a:lnRef>
-      <a:fillRef idx="0">
-        <a:scrgbClr r="0" g="0" b="0"/>
-      </a:fillRef>
-      <a:effectRef idx="0">
-        <a:scrgbClr r="0" g="0" b="0"/>
-      </a:effectRef>
-      <a:fontRef idx="minor"/>
-    </dgm:style>
-  </dgm:styleLbl>
-  <dgm:styleLbl name="parChTrans1D4">
-    <dgm:scene3d>
-      <a:camera prst="orthographicFront"/>
-      <a:lightRig rig="threePt" dir="t"/>
-    </dgm:scene3d>
-    <dgm:sp3d/>
-    <dgm:txPr/>
-    <dgm:style>
-      <a:lnRef idx="2">
-        <a:scrgbClr r="0" g="0" b="0"/>
-      </a:lnRef>
-      <a:fillRef idx="0">
-        <a:scrgbClr r="0" g="0" b="0"/>
-      </a:fillRef>
-      <a:effectRef idx="0">
-        <a:scrgbClr r="0" g="0" b="0"/>
-      </a:effectRef>
-      <a:fontRef idx="minor"/>
-    </dgm:style>
-  </dgm:styleLbl>
-  <dgm:styleLbl name="fgAcc1">
-    <dgm:scene3d>
-      <a:camera prst="orthographicFront"/>
-      <a:lightRig rig="threePt" dir="t"/>
-    </dgm:scene3d>
-    <dgm:sp3d/>
-    <dgm:txPr/>
-    <dgm:style>
-      <a:lnRef idx="2">
-        <a:scrgbClr r="0" g="0" b="0"/>
-      </a:lnRef>
-      <a:fillRef idx="1">
-        <a:scrgbClr r="0" g="0" b="0"/>
-      </a:fillRef>
-      <a:effectRef idx="0">
-        <a:scrgbClr r="0" g="0" b="0"/>
-      </a:effectRef>
-      <a:fontRef idx="minor"/>
-    </dgm:style>
-  </dgm:styleLbl>
-  <dgm:styleLbl name="conFgAcc1">
-    <dgm:scene3d>
-      <a:camera prst="orthographicFront"/>
-      <a:lightRig rig="threePt" dir="t"/>
-    </dgm:scene3d>
-    <dgm:sp3d/>
-    <dgm:txPr/>
-    <dgm:style>
-      <a:lnRef idx="2">
-        <a:scrgbClr r="0" g="0" b="0"/>
-      </a:lnRef>
-      <a:fillRef idx="1">
-        <a:scrgbClr r="0" g="0" b="0"/>
-      </a:fillRef>
-      <a:effectRef idx="0">
-        <a:scrgbClr r="0" g="0" b="0"/>
-      </a:effectRef>
-      <a:fontRef idx="minor"/>
-    </dgm:style>
-  </dgm:styleLbl>
-  <dgm:styleLbl name="alignAcc1">
-    <dgm:scene3d>
-      <a:camera prst="orthographicFront"/>
-      <a:lightRig rig="threePt" dir="t"/>
-    </dgm:scene3d>
-    <dgm:sp3d/>
-    <dgm:txPr/>
-    <dgm:style>
-      <a:lnRef idx="2">
-        <a:scrgbClr r="0" g="0" b="0"/>
-      </a:lnRef>
-      <a:fillRef idx="1">
-        <a:scrgbClr r="0" g="0" b="0"/>
-      </a:fillRef>
-      <a:effectRef idx="0">
-        <a:scrgbClr r="0" g="0" b="0"/>
-      </a:effectRef>
-      <a:fontRef idx="minor"/>
-    </dgm:style>
-  </dgm:styleLbl>
-  <dgm:styleLbl name="trAlignAcc1">
-    <dgm:scene3d>
-      <a:camera prst="orthographicFront"/>
-      <a:lightRig rig="threePt" dir="t"/>
-    </dgm:scene3d>
-    <dgm:sp3d/>
-    <dgm:txPr/>
-    <dgm:style>
-      <a:lnRef idx="1">
-        <a:scrgbClr r="0" g="0" b="0"/>
-      </a:lnRef>
-      <a:fillRef idx="1">
-        <a:scrgbClr r="0" g="0" b="0"/>
-      </a:fillRef>
-      <a:effectRef idx="0">
-        <a:scrgbClr r="0" g="0" b="0"/>
-      </a:effectRef>
-      <a:fontRef idx="minor"/>
-    </dgm:style>
-  </dgm:styleLbl>
-  <dgm:styleLbl name="bgAcc1">
-    <dgm:scene3d>
-      <a:camera prst="orthographicFront"/>
-      <a:lightRig rig="threePt" dir="t"/>
-    </dgm:scene3d>
-    <dgm:sp3d/>
-    <dgm:txPr/>
-    <dgm:style>
-      <a:lnRef idx="2">
-        <a:scrgbClr r="0" g="0" b="0"/>
-      </a:lnRef>
-      <a:fillRef idx="1">
-        <a:scrgbClr r="0" g="0" b="0"/>
-      </a:fillRef>
-      <a:effectRef idx="0">
-        <a:scrgbClr r="0" g="0" b="0"/>
-      </a:effectRef>
-      <a:fontRef idx="minor"/>
-    </dgm:style>
-  </dgm:styleLbl>
-  <dgm:styleLbl name="solidFgAcc1">
-    <dgm:scene3d>
-      <a:camera prst="orthographicFront"/>
-      <a:lightRig rig="threePt" dir="t"/>
-    </dgm:scene3d>
-    <dgm:sp3d/>
-    <dgm:txPr/>
-    <dgm:style>
-      <a:lnRef idx="2">
-        <a:scrgbClr r="0" g="0" b="0"/>
-      </a:lnRef>
-      <a:fillRef idx="1">
-        <a:scrgbClr r="0" g="0" b="0"/>
-      </a:fillRef>
-      <a:effectRef idx="0">
-        <a:scrgbClr r="0" g="0" b="0"/>
-      </a:effectRef>
-      <a:fontRef idx="minor"/>
-    </dgm:style>
-  </dgm:styleLbl>
-  <dgm:styleLbl name="solidAlignAcc1">
-    <dgm:scene3d>
-      <a:camera prst="orthographicFront"/>
-      <a:lightRig rig="threePt" dir="t"/>
-    </dgm:scene3d>
-    <dgm:sp3d/>
-    <dgm:txPr/>
-    <dgm:style>
-      <a:lnRef idx="2">
-        <a:scrgbClr r="0" g="0" b="0"/>
-      </a:lnRef>
-      <a:fillRef idx="1">
-        <a:scrgbClr r="0" g="0" b="0"/>
-      </a:fillRef>
-      <a:effectRef idx="0">
-        <a:scrgbClr r="0" g="0" b="0"/>
-      </a:effectRef>
-      <a:fontRef idx="minor"/>
-    </dgm:style>
-  </dgm:styleLbl>
-  <dgm:styleLbl name="solidBgAcc1">
-    <dgm:scene3d>
-      <a:camera prst="orthographicFront"/>
-      <a:lightRig rig="threePt" dir="t"/>
-    </dgm:scene3d>
-    <dgm:sp3d/>
-    <dgm:txPr/>
-    <dgm:style>
-      <a:lnRef idx="2">
-        <a:scrgbClr r="0" g="0" b="0"/>
-      </a:lnRef>
-      <a:fillRef idx="1">
-        <a:scrgbClr r="0" g="0" b="0"/>
-      </a:fillRef>
-      <a:effectRef idx="0">
-        <a:scrgbClr r="0" g="0" b="0"/>
-      </a:effectRef>
-      <a:fontRef idx="minor"/>
-    </dgm:style>
-  </dgm:styleLbl>
-  <dgm:styleLbl name="fgAccFollowNode1">
-    <dgm:scene3d>
-      <a:camera prst="orthographicFront"/>
-      <a:lightRig rig="threePt" dir="t"/>
-    </dgm:scene3d>
-    <dgm:sp3d/>
-    <dgm:txPr/>
-    <dgm:style>
-      <a:lnRef idx="2">
-        <a:scrgbClr r="0" g="0" b="0"/>
-      </a:lnRef>
-      <a:fillRef idx="1">
-        <a:scrgbClr r="0" g="0" b="0"/>
-      </a:fillRef>
-      <a:effectRef idx="0">
-        <a:scrgbClr r="0" g="0" b="0"/>
-      </a:effectRef>
-      <a:fontRef idx="minor"/>
-    </dgm:style>
-  </dgm:styleLbl>
-  <dgm:styleLbl name="alignAccFollowNode1">
-    <dgm:scene3d>
-      <a:camera prst="orthographicFront"/>
-      <a:lightRig rig="threePt" dir="t"/>
-    </dgm:scene3d>
-    <dgm:sp3d/>
-    <dgm:txPr/>
-    <dgm:style>
-      <a:lnRef idx="2">
-        <a:scrgbClr r="0" g="0" b="0"/>
-      </a:lnRef>
-      <a:fillRef idx="1">
-        <a:scrgbClr r="0" g="0" b="0"/>
-      </a:fillRef>
-      <a:effectRef idx="0">
-        <a:scrgbClr r="0" g="0" b="0"/>
-      </a:effectRef>
-      <a:fontRef idx="minor"/>
-    </dgm:style>
-  </dgm:styleLbl>
-  <dgm:styleLbl name="bgAccFollowNode1">
-    <dgm:scene3d>
-      <a:camera prst="orthographicFront"/>
-      <a:lightRig rig="threePt" dir="t"/>
-    </dgm:scene3d>
-    <dgm:sp3d/>
-    <dgm:txPr/>
-    <dgm:style>
-      <a:lnRef idx="2">
-        <a:scrgbClr r="0" g="0" b="0"/>
-      </a:lnRef>
-      <a:fillRef idx="1">
-        <a:scrgbClr r="0" g="0" b="0"/>
-      </a:fillRef>
-      <a:effectRef idx="0">
-        <a:scrgbClr r="0" g="0" b="0"/>
-      </a:effectRef>
-      <a:fontRef idx="minor"/>
-    </dgm:style>
-  </dgm:styleLbl>
-  <dgm:styleLbl name="fgAcc0">
-    <dgm:scene3d>
-      <a:camera prst="orthographicFront"/>
-      <a:lightRig rig="threePt" dir="t"/>
-    </dgm:scene3d>
-    <dgm:sp3d/>
-    <dgm:txPr/>
-    <dgm:style>
-      <a:lnRef idx="2">
-        <a:scrgbClr r="0" g="0" b="0"/>
-      </a:lnRef>
-      <a:fillRef idx="1">
-        <a:scrgbClr r="0" g="0" b="0"/>
-      </a:fillRef>
-      <a:effectRef idx="0">
-        <a:scrgbClr r="0" g="0" b="0"/>
-      </a:effectRef>
-      <a:fontRef idx="minor"/>
-    </dgm:style>
-  </dgm:styleLbl>
-  <dgm:styleLbl name="fgAcc2">
-    <dgm:scene3d>
-      <a:camera prst="orthographicFront"/>
-      <a:lightRig rig="threePt" dir="t"/>
-    </dgm:scene3d>
-    <dgm:sp3d/>
-    <dgm:txPr/>
-    <dgm:style>
-      <a:lnRef idx="2">
-        <a:scrgbClr r="0" g="0" b="0"/>
-      </a:lnRef>
-      <a:fillRef idx="1">
-        <a:scrgbClr r="0" g="0" b="0"/>
-      </a:fillRef>
-      <a:effectRef idx="0">
-        <a:scrgbClr r="0" g="0" b="0"/>
-      </a:effectRef>
-      <a:fontRef idx="minor"/>
-    </dgm:style>
-  </dgm:styleLbl>
-  <dgm:styleLbl name="fgAcc3">
-    <dgm:scene3d>
-      <a:camera prst="orthographicFront"/>
-      <a:lightRig rig="threePt" dir="t"/>
-    </dgm:scene3d>
-    <dgm:sp3d/>
-    <dgm:txPr/>
-    <dgm:style>
-      <a:lnRef idx="2">
-        <a:scrgbClr r="0" g="0" b="0"/>
-      </a:lnRef>
-      <a:fillRef idx="1">
-        <a:scrgbClr r="0" g="0" b="0"/>
-      </a:fillRef>
-      <a:effectRef idx="0">
-        <a:scrgbClr r="0" g="0" b="0"/>
-      </a:effectRef>
-      <a:fontRef idx="minor"/>
-    </dgm:style>
-  </dgm:styleLbl>
-  <dgm:styleLbl name="fgAcc4">
-    <dgm:scene3d>
-      <a:camera prst="orthographicFront"/>
-      <a:lightRig rig="threePt" dir="t"/>
-    </dgm:scene3d>
-    <dgm:sp3d/>
-    <dgm:txPr/>
-    <dgm:style>
-      <a:lnRef idx="2">
-        <a:scrgbClr r="0" g="0" b="0"/>
-      </a:lnRef>
-      <a:fillRef idx="1">
-        <a:scrgbClr r="0" g="0" b="0"/>
-      </a:fillRef>
-      <a:effectRef idx="0">
-        <a:scrgbClr r="0" g="0" b="0"/>
-      </a:effectRef>
-      <a:fontRef idx="minor"/>
-    </dgm:style>
-  </dgm:styleLbl>
-  <dgm:styleLbl name="bgShp">
-    <dgm:scene3d>
-      <a:camera prst="orthographicFront"/>
-      <a:lightRig rig="threePt" dir="t"/>
-    </dgm:scene3d>
-    <dgm:sp3d/>
-    <dgm:txPr/>
-    <dgm:style>
-      <a:lnRef idx="0">
-        <a:scrgbClr r="0" g="0" b="0"/>
-      </a:lnRef>
-      <a:fillRef idx="1">
-        <a:scrgbClr r="0" g="0" b="0"/>
-      </a:fillRef>
-      <a:effectRef idx="0">
-        <a:scrgbClr r="0" g="0" b="0"/>
-      </a:effectRef>
-      <a:fontRef idx="minor"/>
-    </dgm:style>
-  </dgm:styleLbl>
-  <dgm:styleLbl name="dkBgShp">
-    <dgm:scene3d>
-      <a:camera prst="orthographicFront"/>
-      <a:lightRig rig="threePt" dir="t"/>
-    </dgm:scene3d>
-    <dgm:sp3d/>
-    <dgm:txPr/>
-    <dgm:style>
-      <a:lnRef idx="0">
-        <a:scrgbClr r="0" g="0" b="0"/>
-      </a:lnRef>
-      <a:fillRef idx="1">
-        <a:scrgbClr r="0" g="0" b="0"/>
-      </a:fillRef>
-      <a:effectRef idx="0">
-        <a:scrgbClr r="0" g="0" b="0"/>
-      </a:effectRef>
-      <a:fontRef idx="minor"/>
-    </dgm:style>
-  </dgm:styleLbl>
-  <dgm:styleLbl name="trBgShp">
-    <dgm:scene3d>
-      <a:camera prst="orthographicFront"/>
-      <a:lightRig rig="threePt" dir="t"/>
-    </dgm:scene3d>
-    <dgm:sp3d/>
-    <dgm:txPr/>
-    <dgm:style>
-      <a:lnRef idx="0">
-        <a:scrgbClr r="0" g="0" b="0"/>
-      </a:lnRef>
-      <a:fillRef idx="1">
-        <a:scrgbClr r="0" g="0" b="0"/>
-      </a:fillRef>
-      <a:effectRef idx="0">
-        <a:scrgbClr r="0" g="0" b="0"/>
-      </a:effectRef>
-      <a:fontRef idx="minor"/>
-    </dgm:style>
-  </dgm:styleLbl>
-  <dgm:styleLbl name="fgShp">
-    <dgm:scene3d>
-      <a:camera prst="orthographicFront"/>
-      <a:lightRig rig="threePt" dir="t"/>
-    </dgm:scene3d>
-    <dgm:sp3d/>
-    <dgm:txPr/>
-    <dgm:style>
-      <a:lnRef idx="2">
-        <a:scrgbClr r="0" g="0" b="0"/>
-      </a:lnRef>
-      <a:fillRef idx="1">
-        <a:scrgbClr r="0" g="0" b="0"/>
-      </a:fillRef>
-      <a:effectRef idx="0">
-        <a:scrgbClr r="0" g="0" b="0"/>
-      </a:effectRef>
-      <a:fontRef idx="minor"/>
-    </dgm:style>
-  </dgm:styleLbl>
-  <dgm:styleLbl name="revTx">
-    <dgm:scene3d>
-      <a:camera prst="orthographicFront"/>
-      <a:lightRig rig="threePt" dir="t"/>
-    </dgm:scene3d>
-    <dgm:sp3d/>
-    <dgm:txPr/>
-    <dgm:style>
-      <a:lnRef idx="0">
-        <a:scrgbClr r="0" g="0" b="0"/>
-      </a:lnRef>
-      <a:fillRef idx="0">
-        <a:scrgbClr r="0" g="0" b="0"/>
-      </a:fillRef>
-      <a:effectRef idx="0">
-        <a:scrgbClr r="0" g="0" b="0"/>
-      </a:effectRef>
-      <a:fontRef idx="minor"/>
-    </dgm:style>
-  </dgm:styleLbl>
-</dgm:styleDef>
-</file>
-
-<file path=ppt/diagrams/quickStyle5.xml><?xml version="1.0" encoding="utf-8"?>
 <dgm:styleDef xmlns:dgm="http://schemas.openxmlformats.org/drawingml/2006/diagram" xmlns:a="http://schemas.openxmlformats.org/drawingml/2006/main" uniqueId="urn:microsoft.com/office/officeart/2005/8/quickstyle/simple1">
   <dgm:title val=""/>
   <dgm:desc val=""/>
@@ -17100,7 +17100,7 @@
                   <a:srgbClr val="FF0000"/>
                 </a:solidFill>
               </a:rPr>
-              <a:t>11,64,041,073 </a:t>
+              <a:t>1,164,041,073 </a:t>
             </a:r>
             <a:r>
               <a:rPr lang="en-US" sz="1800" b="1" dirty="0" err="1">

</xml_diff>